<commit_message>
clenup of supervised learning notebook
</commit_message>
<xml_diff>
--- a/Course_2_SupervisedLearning/Supervised_Learning_Project_Report.pptx
+++ b/Course_2_SupervisedLearning/Supervised_Learning_Project_Report.pptx
@@ -268,7 +268,7 @@
           <a:p>
             <a:fld id="{FFAAECC9-DA60-4B3D-8B57-465E6863E578}" type="datetimeFigureOut">
               <a:rPr lang="en-US" smtClean="0"/>
-              <a:t>4/24/2022</a:t>
+              <a:t>4/30/2022</a:t>
             </a:fld>
             <a:endParaRPr lang="en-US"/>
           </a:p>
@@ -466,7 +466,7 @@
           <a:p>
             <a:fld id="{FFAAECC9-DA60-4B3D-8B57-465E6863E578}" type="datetimeFigureOut">
               <a:rPr lang="en-US" smtClean="0"/>
-              <a:t>4/24/2022</a:t>
+              <a:t>4/30/2022</a:t>
             </a:fld>
             <a:endParaRPr lang="en-US"/>
           </a:p>
@@ -674,7 +674,7 @@
           <a:p>
             <a:fld id="{FFAAECC9-DA60-4B3D-8B57-465E6863E578}" type="datetimeFigureOut">
               <a:rPr lang="en-US" smtClean="0"/>
-              <a:t>4/24/2022</a:t>
+              <a:t>4/30/2022</a:t>
             </a:fld>
             <a:endParaRPr lang="en-US"/>
           </a:p>
@@ -872,7 +872,7 @@
           <a:p>
             <a:fld id="{FFAAECC9-DA60-4B3D-8B57-465E6863E578}" type="datetimeFigureOut">
               <a:rPr lang="en-US" smtClean="0"/>
-              <a:t>4/24/2022</a:t>
+              <a:t>4/30/2022</a:t>
             </a:fld>
             <a:endParaRPr lang="en-US"/>
           </a:p>
@@ -1147,7 +1147,7 @@
           <a:p>
             <a:fld id="{FFAAECC9-DA60-4B3D-8B57-465E6863E578}" type="datetimeFigureOut">
               <a:rPr lang="en-US" smtClean="0"/>
-              <a:t>4/24/2022</a:t>
+              <a:t>4/30/2022</a:t>
             </a:fld>
             <a:endParaRPr lang="en-US"/>
           </a:p>
@@ -1412,7 +1412,7 @@
           <a:p>
             <a:fld id="{FFAAECC9-DA60-4B3D-8B57-465E6863E578}" type="datetimeFigureOut">
               <a:rPr lang="en-US" smtClean="0"/>
-              <a:t>4/24/2022</a:t>
+              <a:t>4/30/2022</a:t>
             </a:fld>
             <a:endParaRPr lang="en-US"/>
           </a:p>
@@ -1824,7 +1824,7 @@
           <a:p>
             <a:fld id="{FFAAECC9-DA60-4B3D-8B57-465E6863E578}" type="datetimeFigureOut">
               <a:rPr lang="en-US" smtClean="0"/>
-              <a:t>4/24/2022</a:t>
+              <a:t>4/30/2022</a:t>
             </a:fld>
             <a:endParaRPr lang="en-US"/>
           </a:p>
@@ -1965,7 +1965,7 @@
           <a:p>
             <a:fld id="{FFAAECC9-DA60-4B3D-8B57-465E6863E578}" type="datetimeFigureOut">
               <a:rPr lang="en-US" smtClean="0"/>
-              <a:t>4/24/2022</a:t>
+              <a:t>4/30/2022</a:t>
             </a:fld>
             <a:endParaRPr lang="en-US"/>
           </a:p>
@@ -2078,7 +2078,7 @@
           <a:p>
             <a:fld id="{FFAAECC9-DA60-4B3D-8B57-465E6863E578}" type="datetimeFigureOut">
               <a:rPr lang="en-US" smtClean="0"/>
-              <a:t>4/24/2022</a:t>
+              <a:t>4/30/2022</a:t>
             </a:fld>
             <a:endParaRPr lang="en-US"/>
           </a:p>
@@ -2389,7 +2389,7 @@
           <a:p>
             <a:fld id="{FFAAECC9-DA60-4B3D-8B57-465E6863E578}" type="datetimeFigureOut">
               <a:rPr lang="en-US" smtClean="0"/>
-              <a:t>4/24/2022</a:t>
+              <a:t>4/30/2022</a:t>
             </a:fld>
             <a:endParaRPr lang="en-US"/>
           </a:p>
@@ -2677,7 +2677,7 @@
           <a:p>
             <a:fld id="{FFAAECC9-DA60-4B3D-8B57-465E6863E578}" type="datetimeFigureOut">
               <a:rPr lang="en-US" smtClean="0"/>
-              <a:t>4/24/2022</a:t>
+              <a:t>4/30/2022</a:t>
             </a:fld>
             <a:endParaRPr lang="en-US"/>
           </a:p>
@@ -2918,7 +2918,7 @@
           <a:p>
             <a:fld id="{FFAAECC9-DA60-4B3D-8B57-465E6863E578}" type="datetimeFigureOut">
               <a:rPr lang="en-US" smtClean="0"/>
-              <a:t>4/24/2022</a:t>
+              <a:t>4/30/2022</a:t>
             </a:fld>
             <a:endParaRPr lang="en-US"/>
           </a:p>

</xml_diff>

<commit_message>
Cleaning of Course 5 Repo
</commit_message>
<xml_diff>
--- a/Course_2_SupervisedLearning/Supervised_Learning_Project_Report.pptx
+++ b/Course_2_SupervisedLearning/Supervised_Learning_Project_Report.pptx
@@ -268,7 +268,7 @@
           <a:p>
             <a:fld id="{FFAAECC9-DA60-4B3D-8B57-465E6863E578}" type="datetimeFigureOut">
               <a:rPr lang="en-US" smtClean="0"/>
-              <a:t>4/30/2022</a:t>
+              <a:t>12/18/2022</a:t>
             </a:fld>
             <a:endParaRPr lang="en-US"/>
           </a:p>
@@ -466,7 +466,7 @@
           <a:p>
             <a:fld id="{FFAAECC9-DA60-4B3D-8B57-465E6863E578}" type="datetimeFigureOut">
               <a:rPr lang="en-US" smtClean="0"/>
-              <a:t>4/30/2022</a:t>
+              <a:t>12/18/2022</a:t>
             </a:fld>
             <a:endParaRPr lang="en-US"/>
           </a:p>
@@ -674,7 +674,7 @@
           <a:p>
             <a:fld id="{FFAAECC9-DA60-4B3D-8B57-465E6863E578}" type="datetimeFigureOut">
               <a:rPr lang="en-US" smtClean="0"/>
-              <a:t>4/30/2022</a:t>
+              <a:t>12/18/2022</a:t>
             </a:fld>
             <a:endParaRPr lang="en-US"/>
           </a:p>
@@ -872,7 +872,7 @@
           <a:p>
             <a:fld id="{FFAAECC9-DA60-4B3D-8B57-465E6863E578}" type="datetimeFigureOut">
               <a:rPr lang="en-US" smtClean="0"/>
-              <a:t>4/30/2022</a:t>
+              <a:t>12/18/2022</a:t>
             </a:fld>
             <a:endParaRPr lang="en-US"/>
           </a:p>
@@ -1147,7 +1147,7 @@
           <a:p>
             <a:fld id="{FFAAECC9-DA60-4B3D-8B57-465E6863E578}" type="datetimeFigureOut">
               <a:rPr lang="en-US" smtClean="0"/>
-              <a:t>4/30/2022</a:t>
+              <a:t>12/18/2022</a:t>
             </a:fld>
             <a:endParaRPr lang="en-US"/>
           </a:p>
@@ -1412,7 +1412,7 @@
           <a:p>
             <a:fld id="{FFAAECC9-DA60-4B3D-8B57-465E6863E578}" type="datetimeFigureOut">
               <a:rPr lang="en-US" smtClean="0"/>
-              <a:t>4/30/2022</a:t>
+              <a:t>12/18/2022</a:t>
             </a:fld>
             <a:endParaRPr lang="en-US"/>
           </a:p>
@@ -1824,7 +1824,7 @@
           <a:p>
             <a:fld id="{FFAAECC9-DA60-4B3D-8B57-465E6863E578}" type="datetimeFigureOut">
               <a:rPr lang="en-US" smtClean="0"/>
-              <a:t>4/30/2022</a:t>
+              <a:t>12/18/2022</a:t>
             </a:fld>
             <a:endParaRPr lang="en-US"/>
           </a:p>
@@ -1965,7 +1965,7 @@
           <a:p>
             <a:fld id="{FFAAECC9-DA60-4B3D-8B57-465E6863E578}" type="datetimeFigureOut">
               <a:rPr lang="en-US" smtClean="0"/>
-              <a:t>4/30/2022</a:t>
+              <a:t>12/18/2022</a:t>
             </a:fld>
             <a:endParaRPr lang="en-US"/>
           </a:p>
@@ -2078,7 +2078,7 @@
           <a:p>
             <a:fld id="{FFAAECC9-DA60-4B3D-8B57-465E6863E578}" type="datetimeFigureOut">
               <a:rPr lang="en-US" smtClean="0"/>
-              <a:t>4/30/2022</a:t>
+              <a:t>12/18/2022</a:t>
             </a:fld>
             <a:endParaRPr lang="en-US"/>
           </a:p>
@@ -2389,7 +2389,7 @@
           <a:p>
             <a:fld id="{FFAAECC9-DA60-4B3D-8B57-465E6863E578}" type="datetimeFigureOut">
               <a:rPr lang="en-US" smtClean="0"/>
-              <a:t>4/30/2022</a:t>
+              <a:t>12/18/2022</a:t>
             </a:fld>
             <a:endParaRPr lang="en-US"/>
           </a:p>
@@ -2677,7 +2677,7 @@
           <a:p>
             <a:fld id="{FFAAECC9-DA60-4B3D-8B57-465E6863E578}" type="datetimeFigureOut">
               <a:rPr lang="en-US" smtClean="0"/>
-              <a:t>4/30/2022</a:t>
+              <a:t>12/18/2022</a:t>
             </a:fld>
             <a:endParaRPr lang="en-US"/>
           </a:p>
@@ -2918,7 +2918,7 @@
           <a:p>
             <a:fld id="{FFAAECC9-DA60-4B3D-8B57-465E6863E578}" type="datetimeFigureOut">
               <a:rPr lang="en-US" smtClean="0"/>
-              <a:t>4/30/2022</a:t>
+              <a:t>12/18/2022</a:t>
             </a:fld>
             <a:endParaRPr lang="en-US"/>
           </a:p>
@@ -3564,7 +3564,7 @@
           <a:p>
             <a:r>
               <a:rPr lang="en-US" dirty="0"/>
-              <a:t>Please follow the following link for a summary of the data set and its attributes:</a:t>
+              <a:t>Please use the following link for a summary of the data set and its attributes:</a:t>
             </a:r>
           </a:p>
           <a:p>
@@ -3580,7 +3580,7 @@
           <a:p>
             <a:r>
               <a:rPr lang="en-US" dirty="0"/>
-              <a:t>Cleaning Measures were taken to ensure each column was normally distributed.  </a:t>
+              <a:t>Data were cleaned to ensure each column was normally distributed.  </a:t>
             </a:r>
           </a:p>
           <a:p>
@@ -3609,15 +3609,18 @@
             </a:r>
           </a:p>
           <a:p>
-            <a:pPr lvl="1"/>
-            <a:r>
-              <a:rPr lang="en-US" dirty="0"/>
-              <a:t>Specifics of the cleaning are outside the scope of this report</a:t>
-            </a:r>
-          </a:p>
-          <a:p>
-            <a:pPr lvl="2"/>
-            <a:endParaRPr lang="en-US" dirty="0"/>
+            <a:r>
+              <a:rPr lang="en-US" dirty="0"/>
+              <a:t>Data cleaning details can be seen in the </a:t>
+            </a:r>
+            <a:r>
+              <a:rPr lang="en-US" dirty="0" err="1"/>
+              <a:t>Jupyter</a:t>
+            </a:r>
+            <a:r>
+              <a:rPr lang="en-US" dirty="0"/>
+              <a:t> Notebook.</a:t>
+            </a:r>
           </a:p>
           <a:p>
             <a:pPr marL="914400" lvl="2" indent="0">
@@ -3718,13 +3721,13 @@
           <a:p>
             <a:r>
               <a:rPr lang="en-US" dirty="0"/>
-              <a:t>The goal is to train a model to predict the body fat percentage of a non-obese male using measurements that can be taken from home.  </a:t>
-            </a:r>
-          </a:p>
-          <a:p>
-            <a:r>
-              <a:rPr lang="en-US" dirty="0"/>
-              <a:t>The final model will circumvent the need for the hydrostatic weighing method of body fat percentage determination; reducing costs and eliminating the need of specialized equipment.</a:t>
+              <a:t>The goal is to train a model to predict the body fat percentage of non-obese males using measurements that can be taken from home.  </a:t>
+            </a:r>
+          </a:p>
+          <a:p>
+            <a:r>
+              <a:rPr lang="en-US" dirty="0"/>
+              <a:t>The model will eliminate the need for the hydrostatic weighing method of body fat percentage determination; reducing costs and eliminating the need of specialized equipment.</a:t>
             </a:r>
           </a:p>
           <a:p>
@@ -3737,7 +3740,7 @@
             <a:pPr lvl="1"/>
             <a:r>
               <a:rPr lang="en-US" dirty="0"/>
-              <a:t>The absolute values of the model parameters can shed light on what parts of the body are sensitive to body fat accumulation.</a:t>
+              <a:t>The absolute values of the model parameters can identify body location sensitive to body fat accumulation.</a:t>
             </a:r>
           </a:p>
         </p:txBody>
@@ -3875,7 +3878,7 @@
             <a:pPr lvl="1"/>
             <a:r>
               <a:rPr lang="en-US" dirty="0"/>
-              <a:t>RIDGE and LASSO did not gain a clear benefit from introduction of PFs</a:t>
+              <a:t>RIDGE and LASSO benefited marginally from the introduction of PFs</a:t>
             </a:r>
           </a:p>
           <a:p>
@@ -4008,7 +4011,7 @@
             </a:pPr>
             <a:r>
               <a:rPr lang="en-US" dirty="0"/>
-              <a:t>The 0-weight features in the LASSO model can be used to guide feature elimination.  When simpler models are desired</a:t>
+              <a:t>The 0-weight features in the LASSO model can be used to guide feature elimination. </a:t>
             </a:r>
           </a:p>
         </p:txBody>
@@ -4151,7 +4154,7 @@
             <a:pPr lvl="1"/>
             <a:r>
               <a:rPr lang="en-US" dirty="0"/>
-              <a:t>OLS – 0.661</a:t>
+              <a:t>OLS – 0.660</a:t>
             </a:r>
           </a:p>
           <a:p>
@@ -4299,7 +4302,7 @@
         </p:spPr>
         <p:txBody>
           <a:bodyPr>
-            <a:normAutofit fontScale="92500" lnSpcReduction="20000"/>
+            <a:normAutofit fontScale="92500" lnSpcReduction="10000"/>
           </a:bodyPr>
           <a:lstStyle/>
           <a:p>
@@ -4358,7 +4361,7 @@
             </a:r>
             <a:r>
               <a:rPr lang="en-US" dirty="0"/>
-              <a:t> Degree: alpha = 56.785, R2 = .632</a:t>
+              <a:t> Degree: alpha = 56.785, R2 = .660</a:t>
             </a:r>
           </a:p>
           <a:p>
@@ -4380,15 +4383,7 @@
             <a:pPr lvl="1"/>
             <a:r>
               <a:rPr lang="en-US" dirty="0"/>
-              <a:t>We see that by adding PFs to the model, the alpha value grows to reduce overfitting. The ridge model does not gain a performance boost from introducing PFs, indicated by the marginal </a:t>
-            </a:r>
-            <a:r>
-              <a:rPr lang="en-US" i="1" dirty="0"/>
-              <a:t>decrease</a:t>
-            </a:r>
-            <a:r>
-              <a:rPr lang="en-US" dirty="0"/>
-              <a:t> in R2</a:t>
+              <a:t>We see that by adding PFs to the model, the alpha value grows to reduce overfitting. </a:t>
             </a:r>
           </a:p>
           <a:p>
@@ -4409,7 +4404,7 @@
             </a:r>
             <a:r>
               <a:rPr lang="en-US" dirty="0"/>
-              <a:t> Degree: alpha = 0.257, R2 = .659, sum of |coefficients| = 9.677</a:t>
+              <a:t> Degree: alpha = 0.257, R2 = .660, sum of |coefficients| = 9.677</a:t>
             </a:r>
           </a:p>
           <a:p>
@@ -4539,12 +4534,6 @@
             <a:r>
               <a:rPr lang="en-US" dirty="0"/>
               <a:t>Interestingly, the OLS regression without added features had similar performance to LASSO.  However, the LASSO model is favored due to its feature elimination.</a:t>
-            </a:r>
-          </a:p>
-          <a:p>
-            <a:r>
-              <a:rPr lang="en-US" dirty="0"/>
-              <a:t>Note that none of the linear regressions were great fits for the data.  Confidence should not be placed in the trained LASSO model.  Other algorithms may fit the data better and I am excited to carry this dataset through the course.</a:t>
             </a:r>
           </a:p>
           <a:p>

</xml_diff>